<commit_message>
Added SlotMachine.java and required image icons
</commit_message>
<xml_diff>
--- a/ASSETS_FILES/Assignment_1.pptx
+++ b/ASSETS_FILES/Assignment_1.pptx
@@ -9,6 +9,7 @@
     <p:sldId id="259" r:id="rId3"/>
     <p:sldId id="260" r:id="rId4"/>
     <p:sldId id="258" r:id="rId5"/>
+    <p:sldId id="261" r:id="rId6"/>
   </p:sldIdLst>
   <p:sldSz cx="12192000" cy="6858000"/>
   <p:notesSz cx="6858000" cy="9144000"/>
@@ -5075,6 +5076,495 @@
 </p:sld>
 </file>
 
+<file path=ppt/slides/slide5.xml><?xml version="1.0" encoding="utf-8"?>
+<p:sld xmlns:a="http://schemas.openxmlformats.org/drawingml/2006/main" xmlns:r="http://schemas.openxmlformats.org/officeDocument/2006/relationships" xmlns:p="http://schemas.openxmlformats.org/presentationml/2006/main">
+  <p:cSld>
+    <p:spTree>
+      <p:nvGrpSpPr>
+        <p:cNvPr id="1" name=""/>
+        <p:cNvGrpSpPr/>
+        <p:nvPr/>
+      </p:nvGrpSpPr>
+      <p:grpSpPr>
+        <a:xfrm>
+          <a:off x="0" y="0"/>
+          <a:ext cx="0" cy="0"/>
+          <a:chOff x="0" y="0"/>
+          <a:chExt cx="0" cy="0"/>
+        </a:xfrm>
+      </p:grpSpPr>
+      <p:sp>
+        <p:nvSpPr>
+          <p:cNvPr id="22" name="Rounded Rectangle 21"/>
+          <p:cNvSpPr/>
+          <p:nvPr/>
+        </p:nvSpPr>
+        <p:spPr>
+          <a:xfrm>
+            <a:off x="302703" y="210287"/>
+            <a:ext cx="1740106" cy="2844197"/>
+          </a:xfrm>
+          <a:prstGeom prst="roundRect">
+            <a:avLst/>
+          </a:prstGeom>
+          <a:ln/>
+          <a:scene3d>
+            <a:camera prst="orthographicFront"/>
+            <a:lightRig rig="threePt" dir="t"/>
+          </a:scene3d>
+          <a:sp3d>
+            <a:bevelT w="165100" prst="coolSlant"/>
+          </a:sp3d>
+        </p:spPr>
+        <p:style>
+          <a:lnRef idx="1">
+            <a:schemeClr val="accent2"/>
+          </a:lnRef>
+          <a:fillRef idx="3">
+            <a:schemeClr val="accent2"/>
+          </a:fillRef>
+          <a:effectRef idx="2">
+            <a:schemeClr val="accent2"/>
+          </a:effectRef>
+          <a:fontRef idx="minor">
+            <a:schemeClr val="lt1"/>
+          </a:fontRef>
+        </p:style>
+        <p:txBody>
+          <a:bodyPr rtlCol="0" anchor="ctr"/>
+          <a:lstStyle/>
+          <a:p>
+            <a:pPr algn="ctr"/>
+            <a:endParaRPr lang="en-US" b="1" dirty="0">
+              <a:ln w="6600">
+                <a:solidFill>
+                  <a:schemeClr val="accent2"/>
+                </a:solidFill>
+                <a:prstDash val="solid"/>
+              </a:ln>
+              <a:solidFill>
+                <a:srgbClr val="FFFFFF"/>
+              </a:solidFill>
+              <a:effectLst>
+                <a:outerShdw dist="38100" dir="2700000" algn="tl" rotWithShape="0">
+                  <a:schemeClr val="accent2"/>
+                </a:outerShdw>
+              </a:effectLst>
+            </a:endParaRPr>
+          </a:p>
+        </p:txBody>
+      </p:sp>
+      <p:sp>
+        <p:nvSpPr>
+          <p:cNvPr id="23" name="Rounded Rectangle 22"/>
+          <p:cNvSpPr/>
+          <p:nvPr/>
+        </p:nvSpPr>
+        <p:spPr>
+          <a:xfrm>
+            <a:off x="2692465" y="210287"/>
+            <a:ext cx="1740106" cy="2844197"/>
+          </a:xfrm>
+          <a:prstGeom prst="roundRect">
+            <a:avLst/>
+          </a:prstGeom>
+          <a:ln/>
+          <a:scene3d>
+            <a:camera prst="orthographicFront"/>
+            <a:lightRig rig="threePt" dir="t"/>
+          </a:scene3d>
+          <a:sp3d>
+            <a:bevelT w="165100" prst="coolSlant"/>
+          </a:sp3d>
+        </p:spPr>
+        <p:style>
+          <a:lnRef idx="1">
+            <a:schemeClr val="accent2"/>
+          </a:lnRef>
+          <a:fillRef idx="3">
+            <a:schemeClr val="accent2"/>
+          </a:fillRef>
+          <a:effectRef idx="2">
+            <a:schemeClr val="accent2"/>
+          </a:effectRef>
+          <a:fontRef idx="minor">
+            <a:schemeClr val="lt1"/>
+          </a:fontRef>
+        </p:style>
+        <p:txBody>
+          <a:bodyPr rtlCol="0" anchor="ctr"/>
+          <a:lstStyle/>
+          <a:p>
+            <a:pPr algn="ctr"/>
+            <a:endParaRPr lang="en-US" b="1" dirty="0">
+              <a:ln w="6600">
+                <a:solidFill>
+                  <a:schemeClr val="accent2"/>
+                </a:solidFill>
+                <a:prstDash val="solid"/>
+              </a:ln>
+              <a:solidFill>
+                <a:srgbClr val="FFFFFF"/>
+              </a:solidFill>
+              <a:effectLst>
+                <a:outerShdw dist="38100" dir="2700000" algn="tl" rotWithShape="0">
+                  <a:schemeClr val="accent2"/>
+                </a:outerShdw>
+              </a:effectLst>
+            </a:endParaRPr>
+          </a:p>
+        </p:txBody>
+      </p:sp>
+      <p:sp>
+        <p:nvSpPr>
+          <p:cNvPr id="24" name="Rounded Rectangle 23"/>
+          <p:cNvSpPr/>
+          <p:nvPr/>
+        </p:nvSpPr>
+        <p:spPr>
+          <a:xfrm>
+            <a:off x="5237870" y="210287"/>
+            <a:ext cx="1740106" cy="2844197"/>
+          </a:xfrm>
+          <a:prstGeom prst="roundRect">
+            <a:avLst/>
+          </a:prstGeom>
+          <a:ln/>
+          <a:scene3d>
+            <a:camera prst="orthographicFront"/>
+            <a:lightRig rig="threePt" dir="t"/>
+          </a:scene3d>
+          <a:sp3d>
+            <a:bevelT w="165100" prst="coolSlant"/>
+          </a:sp3d>
+        </p:spPr>
+        <p:style>
+          <a:lnRef idx="1">
+            <a:schemeClr val="accent2"/>
+          </a:lnRef>
+          <a:fillRef idx="3">
+            <a:schemeClr val="accent2"/>
+          </a:fillRef>
+          <a:effectRef idx="2">
+            <a:schemeClr val="accent2"/>
+          </a:effectRef>
+          <a:fontRef idx="minor">
+            <a:schemeClr val="lt1"/>
+          </a:fontRef>
+        </p:style>
+        <p:txBody>
+          <a:bodyPr rtlCol="0" anchor="ctr"/>
+          <a:lstStyle/>
+          <a:p>
+            <a:pPr algn="ctr"/>
+            <a:endParaRPr lang="en-US" b="1" dirty="0">
+              <a:ln w="6600">
+                <a:solidFill>
+                  <a:schemeClr val="accent2"/>
+                </a:solidFill>
+                <a:prstDash val="solid"/>
+              </a:ln>
+              <a:solidFill>
+                <a:srgbClr val="FFFFFF"/>
+              </a:solidFill>
+              <a:effectLst>
+                <a:outerShdw dist="38100" dir="2700000" algn="tl" rotWithShape="0">
+                  <a:schemeClr val="accent2"/>
+                </a:outerShdw>
+              </a:effectLst>
+            </a:endParaRPr>
+          </a:p>
+        </p:txBody>
+      </p:sp>
+      <p:sp>
+        <p:nvSpPr>
+          <p:cNvPr id="25" name="Rounded Rectangle 24"/>
+          <p:cNvSpPr/>
+          <p:nvPr/>
+        </p:nvSpPr>
+        <p:spPr>
+          <a:xfrm>
+            <a:off x="7783275" y="210287"/>
+            <a:ext cx="1740106" cy="2844197"/>
+          </a:xfrm>
+          <a:prstGeom prst="roundRect">
+            <a:avLst/>
+          </a:prstGeom>
+          <a:ln/>
+          <a:scene3d>
+            <a:camera prst="orthographicFront"/>
+            <a:lightRig rig="threePt" dir="t"/>
+          </a:scene3d>
+          <a:sp3d>
+            <a:bevelT w="165100" prst="coolSlant"/>
+          </a:sp3d>
+        </p:spPr>
+        <p:style>
+          <a:lnRef idx="1">
+            <a:schemeClr val="accent2"/>
+          </a:lnRef>
+          <a:fillRef idx="3">
+            <a:schemeClr val="accent2"/>
+          </a:fillRef>
+          <a:effectRef idx="2">
+            <a:schemeClr val="accent2"/>
+          </a:effectRef>
+          <a:fontRef idx="minor">
+            <a:schemeClr val="lt1"/>
+          </a:fontRef>
+        </p:style>
+        <p:txBody>
+          <a:bodyPr rtlCol="0" anchor="ctr"/>
+          <a:lstStyle/>
+          <a:p>
+            <a:pPr algn="ctr"/>
+            <a:endParaRPr lang="en-US" b="1" dirty="0">
+              <a:ln w="6600">
+                <a:solidFill>
+                  <a:schemeClr val="accent2"/>
+                </a:solidFill>
+                <a:prstDash val="solid"/>
+              </a:ln>
+              <a:solidFill>
+                <a:srgbClr val="FFFFFF"/>
+              </a:solidFill>
+              <a:effectLst>
+                <a:outerShdw dist="38100" dir="2700000" algn="tl" rotWithShape="0">
+                  <a:schemeClr val="accent2"/>
+                </a:outerShdw>
+              </a:effectLst>
+            </a:endParaRPr>
+          </a:p>
+        </p:txBody>
+      </p:sp>
+      <p:sp>
+        <p:nvSpPr>
+          <p:cNvPr id="26" name="Rounded Rectangle 25"/>
+          <p:cNvSpPr/>
+          <p:nvPr/>
+        </p:nvSpPr>
+        <p:spPr>
+          <a:xfrm>
+            <a:off x="10328680" y="210287"/>
+            <a:ext cx="1740106" cy="2844197"/>
+          </a:xfrm>
+          <a:prstGeom prst="roundRect">
+            <a:avLst/>
+          </a:prstGeom>
+          <a:ln/>
+          <a:scene3d>
+            <a:camera prst="orthographicFront"/>
+            <a:lightRig rig="threePt" dir="t"/>
+          </a:scene3d>
+          <a:sp3d>
+            <a:bevelT w="165100" prst="coolSlant"/>
+          </a:sp3d>
+        </p:spPr>
+        <p:style>
+          <a:lnRef idx="1">
+            <a:schemeClr val="accent2"/>
+          </a:lnRef>
+          <a:fillRef idx="3">
+            <a:schemeClr val="accent2"/>
+          </a:fillRef>
+          <a:effectRef idx="2">
+            <a:schemeClr val="accent2"/>
+          </a:effectRef>
+          <a:fontRef idx="minor">
+            <a:schemeClr val="lt1"/>
+          </a:fontRef>
+        </p:style>
+        <p:txBody>
+          <a:bodyPr rtlCol="0" anchor="ctr"/>
+          <a:lstStyle/>
+          <a:p>
+            <a:pPr algn="ctr"/>
+            <a:endParaRPr lang="en-US" b="1" dirty="0">
+              <a:ln w="6600">
+                <a:solidFill>
+                  <a:schemeClr val="accent2"/>
+                </a:solidFill>
+                <a:prstDash val="solid"/>
+              </a:ln>
+              <a:solidFill>
+                <a:srgbClr val="FFFFFF"/>
+              </a:solidFill>
+              <a:effectLst>
+                <a:outerShdw dist="38100" dir="2700000" algn="tl" rotWithShape="0">
+                  <a:schemeClr val="accent2"/>
+                </a:outerShdw>
+              </a:effectLst>
+            </a:endParaRPr>
+          </a:p>
+        </p:txBody>
+      </p:sp>
+      <p:pic>
+        <p:nvPicPr>
+          <p:cNvPr id="2" name="Picture 1"/>
+          <p:cNvPicPr>
+            <a:picLocks noChangeAspect="1"/>
+          </p:cNvPicPr>
+          <p:nvPr/>
+        </p:nvPicPr>
+        <p:blipFill rotWithShape="1">
+          <a:blip r:embed="rId2">
+            <a:extLst>
+              <a:ext uri="{28A0092B-C50C-407E-A947-70E740481C1C}">
+                <a14:useLocalDpi xmlns:a14="http://schemas.microsoft.com/office/drawing/2010/main" val="0"/>
+              </a:ext>
+            </a:extLst>
+          </a:blip>
+          <a:srcRect r="50000" b="49401"/>
+          <a:stretch/>
+        </p:blipFill>
+        <p:spPr>
+          <a:xfrm>
+            <a:off x="563156" y="1015489"/>
+            <a:ext cx="1219200" cy="1233791"/>
+          </a:xfrm>
+          <a:prstGeom prst="rect">
+            <a:avLst/>
+          </a:prstGeom>
+        </p:spPr>
+      </p:pic>
+      <p:pic>
+        <p:nvPicPr>
+          <p:cNvPr id="27" name="Picture 26"/>
+          <p:cNvPicPr>
+            <a:picLocks noChangeAspect="1"/>
+          </p:cNvPicPr>
+          <p:nvPr/>
+        </p:nvPicPr>
+        <p:blipFill rotWithShape="1">
+          <a:blip r:embed="rId2">
+            <a:extLst>
+              <a:ext uri="{28A0092B-C50C-407E-A947-70E740481C1C}">
+                <a14:useLocalDpi xmlns:a14="http://schemas.microsoft.com/office/drawing/2010/main" val="0"/>
+              </a:ext>
+            </a:extLst>
+          </a:blip>
+          <a:srcRect l="48005" b="51795"/>
+          <a:stretch/>
+        </p:blipFill>
+        <p:spPr>
+          <a:xfrm>
+            <a:off x="2933462" y="1073855"/>
+            <a:ext cx="1267839" cy="1175425"/>
+          </a:xfrm>
+          <a:prstGeom prst="rect">
+            <a:avLst/>
+          </a:prstGeom>
+        </p:spPr>
+      </p:pic>
+      <p:pic>
+        <p:nvPicPr>
+          <p:cNvPr id="28" name="Picture 27"/>
+          <p:cNvPicPr>
+            <a:picLocks noChangeAspect="1"/>
+          </p:cNvPicPr>
+          <p:nvPr/>
+        </p:nvPicPr>
+        <p:blipFill rotWithShape="1">
+          <a:blip r:embed="rId2">
+            <a:extLst>
+              <a:ext uri="{28A0092B-C50C-407E-A947-70E740481C1C}">
+                <a14:useLocalDpi xmlns:a14="http://schemas.microsoft.com/office/drawing/2010/main" val="0"/>
+              </a:ext>
+            </a:extLst>
+          </a:blip>
+          <a:srcRect t="49801" r="49957"/>
+          <a:stretch/>
+        </p:blipFill>
+        <p:spPr>
+          <a:xfrm>
+            <a:off x="5497799" y="1015489"/>
+            <a:ext cx="1220247" cy="1224065"/>
+          </a:xfrm>
+          <a:prstGeom prst="rect">
+            <a:avLst/>
+          </a:prstGeom>
+        </p:spPr>
+      </p:pic>
+      <p:pic>
+        <p:nvPicPr>
+          <p:cNvPr id="29" name="Picture 28"/>
+          <p:cNvPicPr>
+            <a:picLocks noChangeAspect="1"/>
+          </p:cNvPicPr>
+          <p:nvPr/>
+        </p:nvPicPr>
+        <p:blipFill rotWithShape="1">
+          <a:blip r:embed="rId2">
+            <a:extLst>
+              <a:ext uri="{28A0092B-C50C-407E-A947-70E740481C1C}">
+                <a14:useLocalDpi xmlns:a14="http://schemas.microsoft.com/office/drawing/2010/main" val="0"/>
+              </a:ext>
+            </a:extLst>
+          </a:blip>
+          <a:srcRect l="48979" t="52194"/>
+          <a:stretch/>
+        </p:blipFill>
+        <p:spPr>
+          <a:xfrm>
+            <a:off x="8031280" y="1044671"/>
+            <a:ext cx="1244095" cy="1165699"/>
+          </a:xfrm>
+          <a:prstGeom prst="rect">
+            <a:avLst/>
+          </a:prstGeom>
+        </p:spPr>
+      </p:pic>
+      <p:pic>
+        <p:nvPicPr>
+          <p:cNvPr id="3" name="Picture 2"/>
+          <p:cNvPicPr>
+            <a:picLocks noChangeAspect="1"/>
+          </p:cNvPicPr>
+          <p:nvPr/>
+        </p:nvPicPr>
+        <p:blipFill>
+          <a:blip r:embed="rId3">
+            <a:alphaModFix amt="70000"/>
+            <a:extLst>
+              <a:ext uri="{28A0092B-C50C-407E-A947-70E740481C1C}">
+                <a14:useLocalDpi xmlns:a14="http://schemas.microsoft.com/office/drawing/2010/main" val="0"/>
+              </a:ext>
+            </a:extLst>
+          </a:blip>
+          <a:stretch>
+            <a:fillRect/>
+          </a:stretch>
+        </p:blipFill>
+        <p:spPr>
+          <a:xfrm>
+            <a:off x="10607201" y="1035988"/>
+            <a:ext cx="1183064" cy="1183064"/>
+          </a:xfrm>
+          <a:prstGeom prst="rect">
+            <a:avLst/>
+          </a:prstGeom>
+        </p:spPr>
+      </p:pic>
+    </p:spTree>
+    <p:extLst>
+      <p:ext uri="{BB962C8B-B14F-4D97-AF65-F5344CB8AC3E}">
+        <p14:creationId xmlns:p14="http://schemas.microsoft.com/office/powerpoint/2010/main" val="995566739"/>
+      </p:ext>
+    </p:extLst>
+  </p:cSld>
+  <p:clrMapOvr>
+    <a:masterClrMapping/>
+  </p:clrMapOvr>
+  <p:timing>
+    <p:tnLst>
+      <p:par>
+        <p:cTn id="1" dur="indefinite" restart="never" nodeType="tmRoot"/>
+      </p:par>
+    </p:tnLst>
+  </p:timing>
+</p:sld>
+</file>
+
 <file path=ppt/theme/theme1.xml><?xml version="1.0" encoding="utf-8"?>
 <a:theme xmlns:a="http://schemas.openxmlformats.org/drawingml/2006/main" name="Office Theme">
   <a:themeElements>

</xml_diff>

<commit_message>
added basic view for GameActivity with spin functionality working
</commit_message>
<xml_diff>
--- a/ASSETS_FILES/Assignment_1.pptx
+++ b/ASSETS_FILES/Assignment_1.pptx
@@ -10,6 +10,7 @@
     <p:sldId id="260" r:id="rId4"/>
     <p:sldId id="258" r:id="rId5"/>
     <p:sldId id="261" r:id="rId6"/>
+    <p:sldId id="262" r:id="rId7"/>
   </p:sldIdLst>
   <p:sldSz cx="12192000" cy="6858000"/>
   <p:notesSz cx="6858000" cy="9144000"/>
@@ -3504,6 +3505,56 @@
           </a:p>
         </p:txBody>
       </p:sp>
+      <p:sp>
+        <p:nvSpPr>
+          <p:cNvPr id="10" name="Rounded Rectangle 9"/>
+          <p:cNvSpPr/>
+          <p:nvPr/>
+        </p:nvSpPr>
+        <p:spPr>
+          <a:xfrm>
+            <a:off x="541506" y="911158"/>
+            <a:ext cx="3073941" cy="1147864"/>
+          </a:xfrm>
+          <a:prstGeom prst="roundRect">
+            <a:avLst/>
+          </a:prstGeom>
+        </p:spPr>
+        <p:style>
+          <a:lnRef idx="1">
+            <a:schemeClr val="accent4"/>
+          </a:lnRef>
+          <a:fillRef idx="3">
+            <a:schemeClr val="accent4"/>
+          </a:fillRef>
+          <a:effectRef idx="2">
+            <a:schemeClr val="accent4"/>
+          </a:effectRef>
+          <a:fontRef idx="minor">
+            <a:schemeClr val="lt1"/>
+          </a:fontRef>
+        </p:style>
+        <p:txBody>
+          <a:bodyPr rtlCol="0" anchor="ctr"/>
+          <a:lstStyle/>
+          <a:p>
+            <a:pPr algn="ctr"/>
+            <a:r>
+              <a:rPr lang="en-US" sz="5400" dirty="0" smtClean="0">
+                <a:latin typeface="BEYNO" charset="0"/>
+                <a:ea typeface="BEYNO" charset="0"/>
+                <a:cs typeface="BEYNO" charset="0"/>
+              </a:rPr>
+              <a:t>&gt;SPIN&lt;</a:t>
+            </a:r>
+            <a:endParaRPr lang="en-US" sz="5400" dirty="0">
+              <a:latin typeface="BEYNO" charset="0"/>
+              <a:ea typeface="BEYNO" charset="0"/>
+              <a:cs typeface="BEYNO" charset="0"/>
+            </a:endParaRPr>
+          </a:p>
+        </p:txBody>
+      </p:sp>
     </p:spTree>
     <p:extLst>
       <p:ext uri="{BB962C8B-B14F-4D97-AF65-F5344CB8AC3E}">
@@ -3925,6 +3976,59 @@
           </a:p>
         </p:txBody>
       </p:sp>
+      <p:sp>
+        <p:nvSpPr>
+          <p:cNvPr id="11" name="Rounded Rectangle 10"/>
+          <p:cNvSpPr/>
+          <p:nvPr/>
+        </p:nvSpPr>
+        <p:spPr>
+          <a:xfrm>
+            <a:off x="755515" y="1167320"/>
+            <a:ext cx="3073941" cy="1147864"/>
+          </a:xfrm>
+          <a:prstGeom prst="roundRect">
+            <a:avLst/>
+          </a:prstGeom>
+          <a:solidFill>
+            <a:srgbClr val="F6C328"/>
+          </a:solidFill>
+        </p:spPr>
+        <p:style>
+          <a:lnRef idx="1">
+            <a:schemeClr val="accent4"/>
+          </a:lnRef>
+          <a:fillRef idx="3">
+            <a:schemeClr val="accent4"/>
+          </a:fillRef>
+          <a:effectRef idx="2">
+            <a:schemeClr val="accent4"/>
+          </a:effectRef>
+          <a:fontRef idx="minor">
+            <a:schemeClr val="lt1"/>
+          </a:fontRef>
+        </p:style>
+        <p:txBody>
+          <a:bodyPr rtlCol="0" anchor="ctr"/>
+          <a:lstStyle/>
+          <a:p>
+            <a:pPr algn="ctr"/>
+            <a:r>
+              <a:rPr lang="en-US" sz="5400" smtClean="0">
+                <a:latin typeface="BEYNO" charset="0"/>
+                <a:ea typeface="BEYNO" charset="0"/>
+                <a:cs typeface="BEYNO" charset="0"/>
+              </a:rPr>
+              <a:t>&gt;SPIN&lt;</a:t>
+            </a:r>
+            <a:endParaRPr lang="en-US" sz="5400" dirty="0">
+              <a:latin typeface="BEYNO" charset="0"/>
+              <a:ea typeface="BEYNO" charset="0"/>
+              <a:cs typeface="BEYNO" charset="0"/>
+            </a:endParaRPr>
+          </a:p>
+        </p:txBody>
+      </p:sp>
     </p:spTree>
     <p:extLst>
       <p:ext uri="{BB962C8B-B14F-4D97-AF65-F5344CB8AC3E}">
@@ -5056,6 +5160,46 @@
           </a:p>
         </p:txBody>
       </p:sp>
+      <p:sp>
+        <p:nvSpPr>
+          <p:cNvPr id="22" name="Rounded Rectangle 21"/>
+          <p:cNvSpPr/>
+          <p:nvPr/>
+        </p:nvSpPr>
+        <p:spPr>
+          <a:xfrm>
+            <a:off x="6206247" y="2073666"/>
+            <a:ext cx="2159540" cy="1444486"/>
+          </a:xfrm>
+          <a:prstGeom prst="roundRect">
+            <a:avLst/>
+          </a:prstGeom>
+        </p:spPr>
+        <p:style>
+          <a:lnRef idx="2">
+            <a:schemeClr val="accent1">
+              <a:shade val="50000"/>
+            </a:schemeClr>
+          </a:lnRef>
+          <a:fillRef idx="1">
+            <a:schemeClr val="accent1"/>
+          </a:fillRef>
+          <a:effectRef idx="0">
+            <a:schemeClr val="accent1"/>
+          </a:effectRef>
+          <a:fontRef idx="minor">
+            <a:schemeClr val="lt1"/>
+          </a:fontRef>
+        </p:style>
+        <p:txBody>
+          <a:bodyPr rtlCol="0" anchor="ctr"/>
+          <a:lstStyle/>
+          <a:p>
+            <a:pPr algn="ctr"/>
+            <a:endParaRPr lang="en-US"/>
+          </a:p>
+        </p:txBody>
+      </p:sp>
     </p:spTree>
     <p:extLst>
       <p:ext uri="{BB962C8B-B14F-4D97-AF65-F5344CB8AC3E}">
@@ -5549,6 +5693,274 @@
     <p:extLst>
       <p:ext uri="{BB962C8B-B14F-4D97-AF65-F5344CB8AC3E}">
         <p14:creationId xmlns:p14="http://schemas.microsoft.com/office/powerpoint/2010/main" val="995566739"/>
+      </p:ext>
+    </p:extLst>
+  </p:cSld>
+  <p:clrMapOvr>
+    <a:masterClrMapping/>
+  </p:clrMapOvr>
+  <p:timing>
+    <p:tnLst>
+      <p:par>
+        <p:cTn id="1" dur="indefinite" restart="never" nodeType="tmRoot"/>
+      </p:par>
+    </p:tnLst>
+  </p:timing>
+</p:sld>
+</file>
+
+<file path=ppt/slides/slide6.xml><?xml version="1.0" encoding="utf-8"?>
+<p:sld xmlns:a="http://schemas.openxmlformats.org/drawingml/2006/main" xmlns:r="http://schemas.openxmlformats.org/officeDocument/2006/relationships" xmlns:p="http://schemas.openxmlformats.org/presentationml/2006/main">
+  <p:cSld>
+    <p:spTree>
+      <p:nvGrpSpPr>
+        <p:cNvPr id="1" name=""/>
+        <p:cNvGrpSpPr/>
+        <p:nvPr/>
+      </p:nvGrpSpPr>
+      <p:grpSpPr>
+        <a:xfrm>
+          <a:off x="0" y="0"/>
+          <a:ext cx="0" cy="0"/>
+          <a:chOff x="0" y="0"/>
+          <a:chExt cx="0" cy="0"/>
+        </a:xfrm>
+      </p:grpSpPr>
+      <p:pic>
+        <p:nvPicPr>
+          <p:cNvPr id="4" name="Picture 3"/>
+          <p:cNvPicPr>
+            <a:picLocks noChangeAspect="1"/>
+          </p:cNvPicPr>
+          <p:nvPr/>
+        </p:nvPicPr>
+        <p:blipFill>
+          <a:blip r:embed="rId2">
+            <a:extLst>
+              <a:ext uri="{28A0092B-C50C-407E-A947-70E740481C1C}">
+                <a14:useLocalDpi xmlns:a14="http://schemas.microsoft.com/office/drawing/2010/main" val="0"/>
+              </a:ext>
+            </a:extLst>
+          </a:blip>
+          <a:stretch>
+            <a:fillRect/>
+          </a:stretch>
+        </p:blipFill>
+        <p:spPr>
+          <a:xfrm>
+            <a:off x="2072801" y="1073855"/>
+            <a:ext cx="7036073" cy="4334724"/>
+          </a:xfrm>
+          <a:prstGeom prst="rect">
+            <a:avLst/>
+          </a:prstGeom>
+          <a:solidFill>
+            <a:srgbClr val="000000">
+              <a:shade val="95000"/>
+            </a:srgbClr>
+          </a:solidFill>
+          <a:ln w="444500" cap="sq">
+            <a:solidFill>
+              <a:srgbClr val="000000"/>
+            </a:solidFill>
+            <a:miter lim="800000"/>
+          </a:ln>
+          <a:effectLst>
+            <a:outerShdw blurRad="254000" dist="190500" dir="2700000" sy="90000" algn="bl" rotWithShape="0">
+              <a:srgbClr val="000000">
+                <a:alpha val="40000"/>
+              </a:srgbClr>
+            </a:outerShdw>
+          </a:effectLst>
+        </p:spPr>
+      </p:pic>
+      <p:sp>
+        <p:nvSpPr>
+          <p:cNvPr id="22" name="Rounded Rectangle 21"/>
+          <p:cNvSpPr/>
+          <p:nvPr/>
+        </p:nvSpPr>
+        <p:spPr>
+          <a:xfrm>
+            <a:off x="2825031" y="1760753"/>
+            <a:ext cx="1740106" cy="2844197"/>
+          </a:xfrm>
+          <a:prstGeom prst="roundRect">
+            <a:avLst/>
+          </a:prstGeom>
+          <a:ln/>
+          <a:scene3d>
+            <a:camera prst="orthographicFront"/>
+            <a:lightRig rig="threePt" dir="t"/>
+          </a:scene3d>
+          <a:sp3d>
+            <a:bevelT w="165100" prst="coolSlant"/>
+          </a:sp3d>
+        </p:spPr>
+        <p:style>
+          <a:lnRef idx="1">
+            <a:schemeClr val="accent2"/>
+          </a:lnRef>
+          <a:fillRef idx="3">
+            <a:schemeClr val="accent2"/>
+          </a:fillRef>
+          <a:effectRef idx="2">
+            <a:schemeClr val="accent2"/>
+          </a:effectRef>
+          <a:fontRef idx="minor">
+            <a:schemeClr val="lt1"/>
+          </a:fontRef>
+        </p:style>
+        <p:txBody>
+          <a:bodyPr rtlCol="0" anchor="ctr"/>
+          <a:lstStyle/>
+          <a:p>
+            <a:pPr algn="ctr"/>
+            <a:endParaRPr lang="en-US" b="1" dirty="0">
+              <a:ln w="6600">
+                <a:solidFill>
+                  <a:schemeClr val="accent2"/>
+                </a:solidFill>
+                <a:prstDash val="solid"/>
+              </a:ln>
+              <a:solidFill>
+                <a:srgbClr val="FFFFFF"/>
+              </a:solidFill>
+              <a:effectLst>
+                <a:outerShdw dist="38100" dir="2700000" algn="tl" rotWithShape="0">
+                  <a:schemeClr val="accent2"/>
+                </a:outerShdw>
+              </a:effectLst>
+            </a:endParaRPr>
+          </a:p>
+        </p:txBody>
+      </p:sp>
+      <p:sp>
+        <p:nvSpPr>
+          <p:cNvPr id="13" name="Rounded Rectangle 12"/>
+          <p:cNvSpPr/>
+          <p:nvPr/>
+        </p:nvSpPr>
+        <p:spPr>
+          <a:xfrm>
+            <a:off x="4662419" y="1760752"/>
+            <a:ext cx="1740106" cy="2844197"/>
+          </a:xfrm>
+          <a:prstGeom prst="roundRect">
+            <a:avLst/>
+          </a:prstGeom>
+          <a:ln/>
+          <a:scene3d>
+            <a:camera prst="orthographicFront"/>
+            <a:lightRig rig="threePt" dir="t"/>
+          </a:scene3d>
+          <a:sp3d>
+            <a:bevelT w="165100" prst="coolSlant"/>
+          </a:sp3d>
+        </p:spPr>
+        <p:style>
+          <a:lnRef idx="1">
+            <a:schemeClr val="accent2"/>
+          </a:lnRef>
+          <a:fillRef idx="3">
+            <a:schemeClr val="accent2"/>
+          </a:fillRef>
+          <a:effectRef idx="2">
+            <a:schemeClr val="accent2"/>
+          </a:effectRef>
+          <a:fontRef idx="minor">
+            <a:schemeClr val="lt1"/>
+          </a:fontRef>
+        </p:style>
+        <p:txBody>
+          <a:bodyPr rtlCol="0" anchor="ctr"/>
+          <a:lstStyle/>
+          <a:p>
+            <a:pPr algn="ctr"/>
+            <a:endParaRPr lang="en-US" b="1" dirty="0">
+              <a:ln w="6600">
+                <a:solidFill>
+                  <a:schemeClr val="accent2"/>
+                </a:solidFill>
+                <a:prstDash val="solid"/>
+              </a:ln>
+              <a:solidFill>
+                <a:srgbClr val="FFFFFF"/>
+              </a:solidFill>
+              <a:effectLst>
+                <a:outerShdw dist="38100" dir="2700000" algn="tl" rotWithShape="0">
+                  <a:schemeClr val="accent2"/>
+                </a:outerShdw>
+              </a:effectLst>
+            </a:endParaRPr>
+          </a:p>
+        </p:txBody>
+      </p:sp>
+      <p:sp>
+        <p:nvSpPr>
+          <p:cNvPr id="14" name="Rounded Rectangle 13"/>
+          <p:cNvSpPr/>
+          <p:nvPr/>
+        </p:nvSpPr>
+        <p:spPr>
+          <a:xfrm>
+            <a:off x="6527901" y="1780208"/>
+            <a:ext cx="1740106" cy="2844197"/>
+          </a:xfrm>
+          <a:prstGeom prst="roundRect">
+            <a:avLst/>
+          </a:prstGeom>
+          <a:ln/>
+          <a:scene3d>
+            <a:camera prst="orthographicFront"/>
+            <a:lightRig rig="threePt" dir="t"/>
+          </a:scene3d>
+          <a:sp3d>
+            <a:bevelT w="165100" prst="coolSlant"/>
+          </a:sp3d>
+        </p:spPr>
+        <p:style>
+          <a:lnRef idx="1">
+            <a:schemeClr val="accent2"/>
+          </a:lnRef>
+          <a:fillRef idx="3">
+            <a:schemeClr val="accent2"/>
+          </a:fillRef>
+          <a:effectRef idx="2">
+            <a:schemeClr val="accent2"/>
+          </a:effectRef>
+          <a:fontRef idx="minor">
+            <a:schemeClr val="lt1"/>
+          </a:fontRef>
+        </p:style>
+        <p:txBody>
+          <a:bodyPr rtlCol="0" anchor="ctr"/>
+          <a:lstStyle/>
+          <a:p>
+            <a:pPr algn="ctr"/>
+            <a:endParaRPr lang="en-US" b="1" dirty="0">
+              <a:ln w="6600">
+                <a:solidFill>
+                  <a:schemeClr val="accent2"/>
+                </a:solidFill>
+                <a:prstDash val="solid"/>
+              </a:ln>
+              <a:solidFill>
+                <a:srgbClr val="FFFFFF"/>
+              </a:solidFill>
+              <a:effectLst>
+                <a:outerShdw dist="38100" dir="2700000" algn="tl" rotWithShape="0">
+                  <a:schemeClr val="accent2"/>
+                </a:outerShdw>
+              </a:effectLst>
+            </a:endParaRPr>
+          </a:p>
+        </p:txBody>
+      </p:sp>
+    </p:spTree>
+    <p:extLst>
+      <p:ext uri="{BB962C8B-B14F-4D97-AF65-F5344CB8AC3E}">
+        <p14:creationId xmlns:p14="http://schemas.microsoft.com/office/powerpoint/2010/main" val="1307869844"/>
       </p:ext>
     </p:extLst>
   </p:cSld>

</xml_diff>